<commit_message>
Update presentation and add report
</commit_message>
<xml_diff>
--- a/presentation.pptx
+++ b/presentation.pptx
@@ -27,23 +27,25 @@
     <p:sldId id="272" r:id="rId23"/>
     <p:sldId id="273" r:id="rId24"/>
     <p:sldId id="274" r:id="rId25"/>
+    <p:sldId id="275" r:id="rId26"/>
+    <p:sldId id="276" r:id="rId27"/>
   </p:sldIdLst>
   <p:sldSz cy="5143500" cx="9144000"/>
   <p:notesSz cx="6858000" cy="9144000"/>
   <p:embeddedFontLst>
     <p:embeddedFont>
       <p:font typeface="Raleway"/>
-      <p:regular r:id="rId26"/>
-      <p:bold r:id="rId27"/>
-      <p:italic r:id="rId28"/>
-      <p:boldItalic r:id="rId29"/>
+      <p:regular r:id="rId28"/>
+      <p:bold r:id="rId29"/>
+      <p:italic r:id="rId30"/>
+      <p:boldItalic r:id="rId31"/>
     </p:embeddedFont>
     <p:embeddedFont>
       <p:font typeface="Lato"/>
-      <p:regular r:id="rId30"/>
-      <p:bold r:id="rId31"/>
-      <p:italic r:id="rId32"/>
-      <p:boldItalic r:id="rId33"/>
+      <p:regular r:id="rId32"/>
+      <p:bold r:id="rId33"/>
+      <p:italic r:id="rId34"/>
+      <p:boldItalic r:id="rId35"/>
     </p:embeddedFont>
   </p:embeddedFontLst>
   <p:defaultTextStyle>
@@ -1729,7 +1731,7 @@
       </p:grpSpPr>
       <p:sp>
         <p:nvSpPr>
-          <p:cNvPr id="188" name="Google Shape;188;gcb9a0b074_1_213:notes"/>
+          <p:cNvPr id="188" name="Google Shape;188;ga3071d06e8_0_0:notes"/>
           <p:cNvSpPr/>
           <p:nvPr>
             <p:ph idx="2" type="sldImg"/>
@@ -1764,7 +1766,7 @@
       </p:sp>
       <p:sp>
         <p:nvSpPr>
-          <p:cNvPr id="189" name="Google Shape;189;gcb9a0b074_1_213:notes"/>
+          <p:cNvPr id="189" name="Google Shape;189;ga3071d06e8_0_0:notes"/>
           <p:cNvSpPr txBox="1"/>
           <p:nvPr>
             <p:ph idx="1" type="body"/>
@@ -1864,6 +1866,204 @@
       <p:sp>
         <p:nvSpPr>
           <p:cNvPr id="76" name="Google Shape;76;ga6996b2f71_2_59:notes"/>
+          <p:cNvSpPr txBox="1"/>
+          <p:nvPr>
+            <p:ph idx="1" type="body"/>
+          </p:nvPr>
+        </p:nvSpPr>
+        <p:spPr>
+          <a:xfrm>
+            <a:off x="685800" y="4343400"/>
+            <a:ext cx="5486400" cy="4114800"/>
+          </a:xfrm>
+          <a:prstGeom prst="rect">
+            <a:avLst/>
+          </a:prstGeom>
+        </p:spPr>
+        <p:txBody>
+          <a:bodyPr anchorCtr="0" anchor="t" bIns="91425" lIns="91425" spcFirstLastPara="1" rIns="91425" wrap="square" tIns="91425">
+            <a:noAutofit/>
+          </a:bodyPr>
+          <a:lstStyle/>
+          <a:p>
+            <a:pPr indent="0" lvl="0" marL="0" rtl="0" algn="l">
+              <a:spcBef>
+                <a:spcPts val="0"/>
+              </a:spcBef>
+              <a:spcAft>
+                <a:spcPts val="0"/>
+              </a:spcAft>
+              <a:buNone/>
+            </a:pPr>
+            <a:r>
+              <a:t/>
+            </a:r>
+            <a:endParaRPr/>
+          </a:p>
+        </p:txBody>
+      </p:sp>
+    </p:spTree>
+  </p:cSld>
+  <p:clrMapOvr>
+    <a:masterClrMapping/>
+  </p:clrMapOvr>
+</p:notes>
+</file>
+
+<file path=ppt/notesSlides/notesSlide20.xml><?xml version="1.0" encoding="utf-8"?>
+<p:notes xmlns:a="http://schemas.openxmlformats.org/drawingml/2006/main" xmlns:r="http://schemas.openxmlformats.org/officeDocument/2006/relationships" xmlns:mc="http://schemas.openxmlformats.org/markup-compatibility/2006" xmlns:mv="urn:schemas-microsoft-com:mac:vml" xmlns:p="http://schemas.openxmlformats.org/presentationml/2006/main" xmlns:c="http://schemas.openxmlformats.org/drawingml/2006/chart" xmlns:dgm="http://schemas.openxmlformats.org/drawingml/2006/diagram" xmlns:o="urn:schemas-microsoft-com:office:office" xmlns:v="urn:schemas-microsoft-com:vml" xmlns:pvml="urn:schemas-microsoft-com:office:powerpoint" xmlns:com="http://schemas.openxmlformats.org/drawingml/2006/compatibility" xmlns:p14="http://schemas.microsoft.com/office/powerpoint/2010/main" xmlns:p15="http://schemas.microsoft.com/office/powerpoint/2012/main" xmlns:ahyp="http://schemas.microsoft.com/office/drawing/2018/hyperlinkcolor" showMasterPhAnim="0" showMasterSp="0">
+  <p:cSld>
+    <p:spTree>
+      <p:nvGrpSpPr>
+        <p:cNvPr id="195" name="Shape 195"/>
+        <p:cNvGrpSpPr/>
+        <p:nvPr/>
+      </p:nvGrpSpPr>
+      <p:grpSpPr>
+        <a:xfrm>
+          <a:off x="0" y="0"/>
+          <a:ext cx="0" cy="0"/>
+          <a:chOff x="0" y="0"/>
+          <a:chExt cx="0" cy="0"/>
+        </a:xfrm>
+      </p:grpSpPr>
+      <p:sp>
+        <p:nvSpPr>
+          <p:cNvPr id="196" name="Google Shape;196;ga3071d06e8_0_10:notes"/>
+          <p:cNvSpPr/>
+          <p:nvPr>
+            <p:ph idx="2" type="sldImg"/>
+          </p:nvPr>
+        </p:nvSpPr>
+        <p:spPr>
+          <a:xfrm>
+            <a:off x="381300" y="685800"/>
+            <a:ext cx="6096000" cy="3429000"/>
+          </a:xfrm>
+          <a:custGeom>
+            <a:rect b="b" l="l" r="r" t="t"/>
+            <a:pathLst>
+              <a:path extrusionOk="0" h="120000" w="120000">
+                <a:moveTo>
+                  <a:pt x="0" y="0"/>
+                </a:moveTo>
+                <a:lnTo>
+                  <a:pt x="120000" y="0"/>
+                </a:lnTo>
+                <a:lnTo>
+                  <a:pt x="120000" y="120000"/>
+                </a:lnTo>
+                <a:lnTo>
+                  <a:pt x="0" y="120000"/>
+                </a:lnTo>
+                <a:close/>
+              </a:path>
+            </a:pathLst>
+          </a:custGeom>
+        </p:spPr>
+      </p:sp>
+      <p:sp>
+        <p:nvSpPr>
+          <p:cNvPr id="197" name="Google Shape;197;ga3071d06e8_0_10:notes"/>
+          <p:cNvSpPr txBox="1"/>
+          <p:nvPr>
+            <p:ph idx="1" type="body"/>
+          </p:nvPr>
+        </p:nvSpPr>
+        <p:spPr>
+          <a:xfrm>
+            <a:off x="685800" y="4343400"/>
+            <a:ext cx="5486400" cy="4114800"/>
+          </a:xfrm>
+          <a:prstGeom prst="rect">
+            <a:avLst/>
+          </a:prstGeom>
+        </p:spPr>
+        <p:txBody>
+          <a:bodyPr anchorCtr="0" anchor="t" bIns="91425" lIns="91425" spcFirstLastPara="1" rIns="91425" wrap="square" tIns="91425">
+            <a:noAutofit/>
+          </a:bodyPr>
+          <a:lstStyle/>
+          <a:p>
+            <a:pPr indent="0" lvl="0" marL="0" rtl="0" algn="l">
+              <a:spcBef>
+                <a:spcPts val="0"/>
+              </a:spcBef>
+              <a:spcAft>
+                <a:spcPts val="0"/>
+              </a:spcAft>
+              <a:buNone/>
+            </a:pPr>
+            <a:r>
+              <a:t/>
+            </a:r>
+            <a:endParaRPr/>
+          </a:p>
+        </p:txBody>
+      </p:sp>
+    </p:spTree>
+  </p:cSld>
+  <p:clrMapOvr>
+    <a:masterClrMapping/>
+  </p:clrMapOvr>
+</p:notes>
+</file>
+
+<file path=ppt/notesSlides/notesSlide21.xml><?xml version="1.0" encoding="utf-8"?>
+<p:notes xmlns:a="http://schemas.openxmlformats.org/drawingml/2006/main" xmlns:r="http://schemas.openxmlformats.org/officeDocument/2006/relationships" xmlns:mc="http://schemas.openxmlformats.org/markup-compatibility/2006" xmlns:mv="urn:schemas-microsoft-com:mac:vml" xmlns:p="http://schemas.openxmlformats.org/presentationml/2006/main" xmlns:c="http://schemas.openxmlformats.org/drawingml/2006/chart" xmlns:dgm="http://schemas.openxmlformats.org/drawingml/2006/diagram" xmlns:o="urn:schemas-microsoft-com:office:office" xmlns:v="urn:schemas-microsoft-com:vml" xmlns:pvml="urn:schemas-microsoft-com:office:powerpoint" xmlns:com="http://schemas.openxmlformats.org/drawingml/2006/compatibility" xmlns:p14="http://schemas.microsoft.com/office/powerpoint/2010/main" xmlns:p15="http://schemas.microsoft.com/office/powerpoint/2012/main" xmlns:ahyp="http://schemas.microsoft.com/office/drawing/2018/hyperlinkcolor" showMasterPhAnim="0" showMasterSp="0">
+  <p:cSld>
+    <p:spTree>
+      <p:nvGrpSpPr>
+        <p:cNvPr id="203" name="Shape 203"/>
+        <p:cNvGrpSpPr/>
+        <p:nvPr/>
+      </p:nvGrpSpPr>
+      <p:grpSpPr>
+        <a:xfrm>
+          <a:off x="0" y="0"/>
+          <a:ext cx="0" cy="0"/>
+          <a:chOff x="0" y="0"/>
+          <a:chExt cx="0" cy="0"/>
+        </a:xfrm>
+      </p:grpSpPr>
+      <p:sp>
+        <p:nvSpPr>
+          <p:cNvPr id="204" name="Google Shape;204;gcb9a0b074_1_213:notes"/>
+          <p:cNvSpPr/>
+          <p:nvPr>
+            <p:ph idx="2" type="sldImg"/>
+          </p:nvPr>
+        </p:nvSpPr>
+        <p:spPr>
+          <a:xfrm>
+            <a:off x="381300" y="685800"/>
+            <a:ext cx="6096000" cy="3429000"/>
+          </a:xfrm>
+          <a:custGeom>
+            <a:rect b="b" l="l" r="r" t="t"/>
+            <a:pathLst>
+              <a:path extrusionOk="0" h="120000" w="120000">
+                <a:moveTo>
+                  <a:pt x="0" y="0"/>
+                </a:moveTo>
+                <a:lnTo>
+                  <a:pt x="120000" y="0"/>
+                </a:lnTo>
+                <a:lnTo>
+                  <a:pt x="120000" y="120000"/>
+                </a:lnTo>
+                <a:lnTo>
+                  <a:pt x="0" y="120000"/>
+                </a:lnTo>
+                <a:close/>
+              </a:path>
+            </a:pathLst>
+          </a:custGeom>
+        </p:spPr>
+      </p:sp>
+      <p:sp>
+        <p:nvSpPr>
+          <p:cNvPr id="205" name="Google Shape;205;gcb9a0b074_1_213:notes"/>
           <p:cNvSpPr txBox="1"/>
           <p:nvPr>
             <p:ph idx="1" type="body"/>
@@ -5826,7 +6026,7 @@
     <p:bg>
       <p:bgPr>
         <a:solidFill>
-          <a:srgbClr val="353535"/>
+          <a:schemeClr val="lt2"/>
         </a:solidFill>
       </p:bgPr>
     </p:bg>
@@ -9442,7 +9642,7 @@
             <a:tbl>
               <a:tblPr>
                 <a:noFill/>
-                <a:tableStyleId>{C9E5065E-3CC1-4FE6-BD98-E28962CB1B46}</a:tableStyleId>
+                <a:tableStyleId>{BCDB4CB0-3A0A-4F4D-8863-72361DF3DC8B}</a:tableStyleId>
               </a:tblPr>
               <a:tblGrid>
                 <a:gridCol w="3619500"/>
@@ -10151,7 +10351,7 @@
         </p:nvSpPr>
         <p:spPr>
           <a:xfrm>
-            <a:off x="535775" y="712150"/>
+            <a:off x="368375" y="766625"/>
             <a:ext cx="8067300" cy="768000"/>
           </a:xfrm>
           <a:prstGeom prst="rect">
@@ -10864,13 +11064,6 @@
 <file path=ppt/slides/slide19.xml><?xml version="1.0" encoding="utf-8"?>
 <p:sld xmlns:a="http://schemas.openxmlformats.org/drawingml/2006/main" xmlns:r="http://schemas.openxmlformats.org/officeDocument/2006/relationships" xmlns:mc="http://schemas.openxmlformats.org/markup-compatibility/2006" xmlns:mv="urn:schemas-microsoft-com:mac:vml" xmlns:p="http://schemas.openxmlformats.org/presentationml/2006/main" xmlns:c="http://schemas.openxmlformats.org/drawingml/2006/chart" xmlns:dgm="http://schemas.openxmlformats.org/drawingml/2006/diagram" xmlns:o="urn:schemas-microsoft-com:office:office" xmlns:v="urn:schemas-microsoft-com:vml" xmlns:pvml="urn:schemas-microsoft-com:office:powerpoint" xmlns:com="http://schemas.openxmlformats.org/drawingml/2006/compatibility" xmlns:p14="http://schemas.microsoft.com/office/powerpoint/2010/main" xmlns:p15="http://schemas.microsoft.com/office/powerpoint/2012/main" xmlns:ahyp="http://schemas.microsoft.com/office/drawing/2018/hyperlinkcolor">
   <p:cSld>
-    <p:bg>
-      <p:bgPr>
-        <a:solidFill>
-          <a:schemeClr val="dk1"/>
-        </a:solidFill>
-      </p:bgPr>
-    </p:bg>
     <p:spTree>
       <p:nvGrpSpPr>
         <p:cNvPr id="190" name="Shape 190"/>
@@ -10885,9 +11078,145 @@
           <a:chExt cx="0" cy="0"/>
         </a:xfrm>
       </p:grpSpPr>
+      <p:sp>
+        <p:nvSpPr>
+          <p:cNvPr id="191" name="Google Shape;191;p31"/>
+          <p:cNvSpPr txBox="1"/>
+          <p:nvPr>
+            <p:ph idx="4294967295" type="title"/>
+          </p:nvPr>
+        </p:nvSpPr>
+        <p:spPr>
+          <a:xfrm>
+            <a:off x="37900" y="77500"/>
+            <a:ext cx="8922900" cy="768000"/>
+          </a:xfrm>
+          <a:prstGeom prst="rect">
+            <a:avLst/>
+          </a:prstGeom>
+        </p:spPr>
+        <p:txBody>
+          <a:bodyPr anchorCtr="0" anchor="t" bIns="91425" lIns="91425" spcFirstLastPara="1" rIns="91425" wrap="square" tIns="91425">
+            <a:noAutofit/>
+          </a:bodyPr>
+          <a:lstStyle/>
+          <a:p>
+            <a:pPr indent="0" lvl="0" marL="0" rtl="0" algn="l">
+              <a:spcBef>
+                <a:spcPts val="0"/>
+              </a:spcBef>
+              <a:spcAft>
+                <a:spcPts val="1600"/>
+              </a:spcAft>
+              <a:buNone/>
+            </a:pPr>
+            <a:r>
+              <a:rPr lang="en" sz="2400">
+                <a:solidFill>
+                  <a:schemeClr val="dk1"/>
+                </a:solidFill>
+              </a:rPr>
+              <a:t>Comparison</a:t>
+            </a:r>
+            <a:r>
+              <a:rPr lang="en" sz="2400">
+                <a:solidFill>
+                  <a:schemeClr val="dk1"/>
+                </a:solidFill>
+              </a:rPr>
+              <a:t> With Different Sentiment Analysis Approaches </a:t>
+            </a:r>
+            <a:endParaRPr sz="2400">
+              <a:solidFill>
+                <a:schemeClr val="dk1"/>
+              </a:solidFill>
+            </a:endParaRPr>
+          </a:p>
+        </p:txBody>
+      </p:sp>
+      <p:sp>
+        <p:nvSpPr>
+          <p:cNvPr id="192" name="Google Shape;192;p31"/>
+          <p:cNvSpPr txBox="1"/>
+          <p:nvPr>
+            <p:ph idx="4294967295" type="title"/>
+          </p:nvPr>
+        </p:nvSpPr>
+        <p:spPr>
+          <a:xfrm>
+            <a:off x="96800" y="712925"/>
+            <a:ext cx="8333700" cy="480600"/>
+          </a:xfrm>
+          <a:prstGeom prst="rect">
+            <a:avLst/>
+          </a:prstGeom>
+        </p:spPr>
+        <p:txBody>
+          <a:bodyPr anchorCtr="0" anchor="t" bIns="91425" lIns="91425" spcFirstLastPara="1" rIns="91425" wrap="square" tIns="91425">
+            <a:noAutofit/>
+          </a:bodyPr>
+          <a:lstStyle/>
+          <a:p>
+            <a:pPr indent="0" lvl="0" marL="0" marR="279400" rtl="0" algn="ctr">
+              <a:lnSpc>
+                <a:spcPct val="142857"/>
+              </a:lnSpc>
+              <a:spcBef>
+                <a:spcPts val="0"/>
+              </a:spcBef>
+              <a:spcAft>
+                <a:spcPts val="0"/>
+              </a:spcAft>
+              <a:buNone/>
+            </a:pPr>
+            <a:r>
+              <a:rPr b="0" lang="en" sz="1550" u="sng">
+                <a:solidFill>
+                  <a:srgbClr val="0000FF"/>
+                </a:solidFill>
+                <a:highlight>
+                  <a:srgbClr val="FFFFFF"/>
+                </a:highlight>
+                <a:latin typeface="Arial"/>
+                <a:ea typeface="Arial"/>
+                <a:cs typeface="Arial"/>
+                <a:sym typeface="Arial"/>
+              </a:rPr>
+              <a:t>Using </a:t>
+            </a:r>
+            <a:r>
+              <a:rPr b="0" lang="en" sz="1600" u="sng">
+                <a:solidFill>
+                  <a:srgbClr val="0000FF"/>
+                </a:solidFill>
+                <a:highlight>
+                  <a:srgbClr val="FFFFFF"/>
+                </a:highlight>
+                <a:latin typeface="Arial"/>
+                <a:ea typeface="Arial"/>
+                <a:cs typeface="Arial"/>
+                <a:sym typeface="Arial"/>
+              </a:rPr>
+              <a:t> Convolutional neural network (CNN)</a:t>
+            </a:r>
+            <a:endParaRPr b="0" sz="1650" u="sng">
+              <a:solidFill>
+                <a:srgbClr val="0000FF"/>
+              </a:solidFill>
+              <a:highlight>
+                <a:srgbClr val="FFFFFF"/>
+              </a:highlight>
+              <a:latin typeface="Arial"/>
+              <a:ea typeface="Arial"/>
+              <a:cs typeface="Arial"/>
+              <a:sym typeface="Arial"/>
+            </a:endParaRPr>
+          </a:p>
+        </p:txBody>
+      </p:sp>
       <p:pic>
         <p:nvPicPr>
-          <p:cNvPr id="191" name="Google Shape;191;p31"/>
+          <p:cNvPr id="193" name="Google Shape;193;p31"/>
           <p:cNvPicPr preferRelativeResize="0"/>
           <p:nvPr/>
         </p:nvPicPr>
@@ -10901,8 +11230,8 @@
         </p:blipFill>
         <p:spPr>
           <a:xfrm>
-            <a:off x="2444700" y="162737"/>
-            <a:ext cx="4254600" cy="4818038"/>
+            <a:off x="1307550" y="1278776"/>
+            <a:ext cx="5912200" cy="2755225"/>
           </a:xfrm>
           <a:prstGeom prst="rect">
             <a:avLst/>
@@ -10913,103 +11242,18 @@
           </a:ln>
         </p:spPr>
       </p:pic>
-      <p:pic>
-        <p:nvPicPr>
-          <p:cNvPr descr="Piece of duct tape sticking a note to the slide" id="192" name="Google Shape;192;p31"/>
-          <p:cNvPicPr preferRelativeResize="0"/>
-          <p:nvPr/>
-        </p:nvPicPr>
-        <p:blipFill rotWithShape="1">
-          <a:blip r:embed="rId4">
-            <a:alphaModFix/>
-          </a:blip>
-          <a:srcRect b="10011" l="9244" r="2118" t="5926"/>
-          <a:stretch/>
-        </p:blipFill>
-        <p:spPr>
-          <a:xfrm rot="154828">
-            <a:off x="3536000" y="147301"/>
-            <a:ext cx="2072000" cy="736050"/>
-          </a:xfrm>
-          <a:prstGeom prst="rect">
-            <a:avLst/>
-          </a:prstGeom>
-          <a:noFill/>
-          <a:ln>
-            <a:noFill/>
-          </a:ln>
-        </p:spPr>
-      </p:pic>
-      <p:sp>
-        <p:nvSpPr>
-          <p:cNvPr id="193" name="Google Shape;193;p31"/>
-          <p:cNvSpPr txBox="1"/>
-          <p:nvPr/>
-        </p:nvSpPr>
-        <p:spPr>
-          <a:xfrm>
-            <a:off x="2855550" y="687397"/>
-            <a:ext cx="3432900" cy="762600"/>
-          </a:xfrm>
-          <a:prstGeom prst="rect">
-            <a:avLst/>
-          </a:prstGeom>
-          <a:noFill/>
-          <a:ln>
-            <a:noFill/>
-          </a:ln>
-        </p:spPr>
-        <p:txBody>
-          <a:bodyPr anchorCtr="0" anchor="b" bIns="91425" lIns="91425" spcFirstLastPara="1" rIns="91425" wrap="square" tIns="91425">
-            <a:noAutofit/>
-          </a:bodyPr>
-          <a:lstStyle/>
-          <a:p>
-            <a:pPr indent="0" lvl="0" marL="0" rtl="0" algn="l">
-              <a:spcBef>
-                <a:spcPts val="0"/>
-              </a:spcBef>
-              <a:spcAft>
-                <a:spcPts val="0"/>
-              </a:spcAft>
-              <a:buNone/>
-            </a:pPr>
-            <a:r>
-              <a:rPr b="1" lang="en" sz="3000">
-                <a:solidFill>
-                  <a:schemeClr val="lt2"/>
-                </a:solidFill>
-                <a:latin typeface="Raleway"/>
-                <a:ea typeface="Raleway"/>
-                <a:cs typeface="Raleway"/>
-                <a:sym typeface="Raleway"/>
-              </a:rPr>
-              <a:t>Thank You!</a:t>
-            </a:r>
-            <a:endParaRPr b="1" sz="3000">
-              <a:solidFill>
-                <a:schemeClr val="lt2"/>
-              </a:solidFill>
-              <a:latin typeface="Raleway"/>
-              <a:ea typeface="Raleway"/>
-              <a:cs typeface="Raleway"/>
-              <a:sym typeface="Raleway"/>
-            </a:endParaRPr>
-          </a:p>
-        </p:txBody>
-      </p:sp>
       <p:sp>
         <p:nvSpPr>
           <p:cNvPr id="194" name="Google Shape;194;p31"/>
           <p:cNvSpPr txBox="1"/>
           <p:nvPr>
-            <p:ph idx="4294967295" type="body"/>
+            <p:ph idx="4294967295" type="title"/>
           </p:nvPr>
         </p:nvSpPr>
         <p:spPr>
           <a:xfrm>
-            <a:off x="2855550" y="1377478"/>
-            <a:ext cx="3432900" cy="1633500"/>
+            <a:off x="96800" y="4161700"/>
+            <a:ext cx="8333700" cy="981900"/>
           </a:xfrm>
           <a:prstGeom prst="rect">
             <a:avLst/>
@@ -11021,7 +11265,10 @@
           </a:bodyPr>
           <a:lstStyle/>
           <a:p>
-            <a:pPr indent="-304800" lvl="0" marL="457200" rtl="0" algn="l">
+            <a:pPr indent="-327025" lvl="0" marL="457200" marR="279400" rtl="0" algn="l">
+              <a:lnSpc>
+                <a:spcPct val="142857"/>
+              </a:lnSpc>
               <a:spcBef>
                 <a:spcPts val="0"/>
               </a:spcBef>
@@ -11029,162 +11276,84 @@
                 <a:spcPts val="0"/>
               </a:spcAft>
               <a:buClr>
-                <a:schemeClr val="dk1"/>
+                <a:srgbClr val="000000"/>
               </a:buClr>
-              <a:buSzPts val="1200"/>
-              <a:buFont typeface="Raleway"/>
-              <a:buChar char="-"/>
+              <a:buSzPts val="1550"/>
+              <a:buFont typeface="Arial"/>
+              <a:buChar char="●"/>
             </a:pPr>
             <a:r>
-              <a:rPr lang="en" sz="1200">
-                <a:latin typeface="Raleway"/>
-                <a:ea typeface="Raleway"/>
-                <a:cs typeface="Raleway"/>
-                <a:sym typeface="Raleway"/>
+              <a:rPr b="0" lang="en" sz="1550">
+                <a:solidFill>
+                  <a:srgbClr val="000000"/>
+                </a:solidFill>
+                <a:highlight>
+                  <a:srgbClr val="FFFFFF"/>
+                </a:highlight>
+                <a:latin typeface="Arial"/>
+                <a:ea typeface="Arial"/>
+                <a:cs typeface="Arial"/>
+                <a:sym typeface="Arial"/>
               </a:rPr>
-              <a:t>Nishant Mittal (18074013)</a:t>
+              <a:t>With This approach a maximum accuracy of 94.4% was achieved.</a:t>
             </a:r>
-            <a:endParaRPr sz="1200">
-              <a:latin typeface="Raleway"/>
-              <a:ea typeface="Raleway"/>
-              <a:cs typeface="Raleway"/>
-              <a:sym typeface="Raleway"/>
+            <a:endParaRPr b="0" sz="1550">
+              <a:solidFill>
+                <a:srgbClr val="000000"/>
+              </a:solidFill>
+              <a:highlight>
+                <a:srgbClr val="FFFFFF"/>
+              </a:highlight>
+              <a:latin typeface="Arial"/>
+              <a:ea typeface="Arial"/>
+              <a:cs typeface="Arial"/>
+              <a:sym typeface="Arial"/>
             </a:endParaRPr>
           </a:p>
           <a:p>
-            <a:pPr indent="-304800" lvl="0" marL="457200" rtl="0" algn="l">
-              <a:spcBef>
-                <a:spcPts val="0"/>
-              </a:spcBef>
-              <a:spcAft>
-                <a:spcPts val="0"/>
-              </a:spcAft>
-              <a:buSzPts val="1200"/>
-              <a:buFont typeface="Raleway"/>
-              <a:buChar char="-"/>
+            <a:pPr indent="-327025" lvl="0" marL="457200" marR="279400" rtl="0" algn="l">
+              <a:lnSpc>
+                <a:spcPct val="142857"/>
+              </a:lnSpc>
+              <a:spcBef>
+                <a:spcPts val="0"/>
+              </a:spcBef>
+              <a:spcAft>
+                <a:spcPts val="0"/>
+              </a:spcAft>
+              <a:buClr>
+                <a:srgbClr val="000000"/>
+              </a:buClr>
+              <a:buSzPts val="1550"/>
+              <a:buFont typeface="Arial"/>
+              <a:buChar char="●"/>
             </a:pPr>
             <a:r>
-              <a:rPr lang="en" sz="1200">
-                <a:latin typeface="Raleway"/>
-                <a:ea typeface="Raleway"/>
-                <a:cs typeface="Raleway"/>
-                <a:sym typeface="Raleway"/>
+              <a:rPr b="0" lang="en" sz="1550">
+                <a:solidFill>
+                  <a:srgbClr val="000000"/>
+                </a:solidFill>
+                <a:highlight>
+                  <a:srgbClr val="FFFFFF"/>
+                </a:highlight>
+                <a:latin typeface="Arial"/>
+                <a:ea typeface="Arial"/>
+                <a:cs typeface="Arial"/>
+                <a:sym typeface="Arial"/>
               </a:rPr>
-              <a:t>Mudit Bhardwaj (18074011)</a:t>
+              <a:t>Link :https://www.kaggle.com/kevinautin/fully-convolutional-accuracy-94-4-15-min</a:t>
             </a:r>
-            <a:endParaRPr sz="1200">
-              <a:latin typeface="Raleway"/>
-              <a:ea typeface="Raleway"/>
-              <a:cs typeface="Raleway"/>
-              <a:sym typeface="Raleway"/>
-            </a:endParaRPr>
-          </a:p>
-          <a:p>
-            <a:pPr indent="-304800" lvl="0" marL="457200" rtl="0" algn="l">
-              <a:spcBef>
-                <a:spcPts val="0"/>
-              </a:spcBef>
-              <a:spcAft>
-                <a:spcPts val="0"/>
-              </a:spcAft>
-              <a:buSzPts val="1200"/>
-              <a:buFont typeface="Raleway"/>
-              <a:buChar char="-"/>
-            </a:pPr>
-            <a:r>
-              <a:rPr lang="en" sz="1200">
-                <a:latin typeface="Raleway"/>
-                <a:ea typeface="Raleway"/>
-                <a:cs typeface="Raleway"/>
-                <a:sym typeface="Raleway"/>
-              </a:rPr>
-              <a:t>Aditya Patidar (18075006)</a:t>
-            </a:r>
-            <a:endParaRPr sz="1200">
-              <a:latin typeface="Raleway"/>
-              <a:ea typeface="Raleway"/>
-              <a:cs typeface="Raleway"/>
-              <a:sym typeface="Raleway"/>
-            </a:endParaRPr>
-          </a:p>
-          <a:p>
-            <a:pPr indent="-304800" lvl="0" marL="457200" rtl="0" algn="l">
-              <a:spcBef>
-                <a:spcPts val="0"/>
-              </a:spcBef>
-              <a:spcAft>
-                <a:spcPts val="0"/>
-              </a:spcAft>
-              <a:buSzPts val="1200"/>
-              <a:buFont typeface="Raleway"/>
-              <a:buChar char="-"/>
-            </a:pPr>
-            <a:r>
-              <a:rPr lang="en" sz="1200">
-                <a:latin typeface="Raleway"/>
-                <a:ea typeface="Raleway"/>
-                <a:cs typeface="Raleway"/>
-                <a:sym typeface="Raleway"/>
-              </a:rPr>
-              <a:t>Ayush Damele (18075014)</a:t>
-            </a:r>
-            <a:endParaRPr sz="1200">
-              <a:latin typeface="Raleway"/>
-              <a:ea typeface="Raleway"/>
-              <a:cs typeface="Raleway"/>
-              <a:sym typeface="Raleway"/>
-            </a:endParaRPr>
-          </a:p>
-        </p:txBody>
-      </p:sp>
-      <p:sp>
-        <p:nvSpPr>
-          <p:cNvPr id="195" name="Google Shape;195;p31"/>
-          <p:cNvSpPr txBox="1"/>
-          <p:nvPr/>
-        </p:nvSpPr>
-        <p:spPr>
-          <a:xfrm>
-            <a:off x="2855550" y="3495513"/>
-            <a:ext cx="2103000" cy="1012200"/>
-          </a:xfrm>
-          <a:prstGeom prst="rect">
-            <a:avLst/>
-          </a:prstGeom>
-          <a:noFill/>
-          <a:ln>
-            <a:noFill/>
-          </a:ln>
-        </p:spPr>
-        <p:txBody>
-          <a:bodyPr anchorCtr="0" anchor="b" bIns="91425" lIns="91425" spcFirstLastPara="1" rIns="91425" wrap="square" tIns="91425">
-            <a:noAutofit/>
-          </a:bodyPr>
-          <a:lstStyle/>
-          <a:p>
-            <a:pPr indent="0" lvl="0" marL="0" rtl="0" algn="l">
-              <a:lnSpc>
-                <a:spcPct val="115000"/>
-              </a:lnSpc>
-              <a:spcBef>
-                <a:spcPts val="0"/>
-              </a:spcBef>
-              <a:spcAft>
-                <a:spcPts val="0"/>
-              </a:spcAft>
-              <a:buNone/>
-            </a:pPr>
-            <a:r>
-              <a:t/>
-            </a:r>
-            <a:endParaRPr sz="1200">
+            <a:endParaRPr b="0" sz="1550">
               <a:solidFill>
-                <a:schemeClr val="dk2"/>
+                <a:srgbClr val="000000"/>
               </a:solidFill>
-              <a:latin typeface="Raleway"/>
-              <a:ea typeface="Raleway"/>
-              <a:cs typeface="Raleway"/>
-              <a:sym typeface="Raleway"/>
+              <a:highlight>
+                <a:srgbClr val="FFFFFF"/>
+              </a:highlight>
+              <a:latin typeface="Arial"/>
+              <a:ea typeface="Arial"/>
+              <a:cs typeface="Arial"/>
+              <a:sym typeface="Arial"/>
             </a:endParaRPr>
           </a:p>
         </p:txBody>
@@ -11242,6 +11411,669 @@
           </a:ln>
         </p:spPr>
       </p:pic>
+    </p:spTree>
+  </p:cSld>
+  <p:clrMapOvr>
+    <a:masterClrMapping/>
+  </p:clrMapOvr>
+</p:sld>
+</file>
+
+<file path=ppt/slides/slide20.xml><?xml version="1.0" encoding="utf-8"?>
+<p:sld xmlns:a="http://schemas.openxmlformats.org/drawingml/2006/main" xmlns:r="http://schemas.openxmlformats.org/officeDocument/2006/relationships" xmlns:mc="http://schemas.openxmlformats.org/markup-compatibility/2006" xmlns:mv="urn:schemas-microsoft-com:mac:vml" xmlns:p="http://schemas.openxmlformats.org/presentationml/2006/main" xmlns:c="http://schemas.openxmlformats.org/drawingml/2006/chart" xmlns:dgm="http://schemas.openxmlformats.org/drawingml/2006/diagram" xmlns:o="urn:schemas-microsoft-com:office:office" xmlns:v="urn:schemas-microsoft-com:vml" xmlns:pvml="urn:schemas-microsoft-com:office:powerpoint" xmlns:com="http://schemas.openxmlformats.org/drawingml/2006/compatibility" xmlns:p14="http://schemas.microsoft.com/office/powerpoint/2010/main" xmlns:p15="http://schemas.microsoft.com/office/powerpoint/2012/main" xmlns:ahyp="http://schemas.microsoft.com/office/drawing/2018/hyperlinkcolor">
+  <p:cSld>
+    <p:spTree>
+      <p:nvGrpSpPr>
+        <p:cNvPr id="198" name="Shape 198"/>
+        <p:cNvGrpSpPr/>
+        <p:nvPr/>
+      </p:nvGrpSpPr>
+      <p:grpSpPr>
+        <a:xfrm>
+          <a:off x="0" y="0"/>
+          <a:ext cx="0" cy="0"/>
+          <a:chOff x="0" y="0"/>
+          <a:chExt cx="0" cy="0"/>
+        </a:xfrm>
+      </p:grpSpPr>
+      <p:sp>
+        <p:nvSpPr>
+          <p:cNvPr id="199" name="Google Shape;199;p32"/>
+          <p:cNvSpPr txBox="1"/>
+          <p:nvPr>
+            <p:ph idx="4294967295" type="title"/>
+          </p:nvPr>
+        </p:nvSpPr>
+        <p:spPr>
+          <a:xfrm>
+            <a:off x="37900" y="77500"/>
+            <a:ext cx="8922900" cy="768000"/>
+          </a:xfrm>
+          <a:prstGeom prst="rect">
+            <a:avLst/>
+          </a:prstGeom>
+        </p:spPr>
+        <p:txBody>
+          <a:bodyPr anchorCtr="0" anchor="t" bIns="91425" lIns="91425" spcFirstLastPara="1" rIns="91425" wrap="square" tIns="91425">
+            <a:noAutofit/>
+          </a:bodyPr>
+          <a:lstStyle/>
+          <a:p>
+            <a:pPr indent="0" lvl="0" marL="0" rtl="0" algn="l">
+              <a:spcBef>
+                <a:spcPts val="0"/>
+              </a:spcBef>
+              <a:spcAft>
+                <a:spcPts val="1600"/>
+              </a:spcAft>
+              <a:buNone/>
+            </a:pPr>
+            <a:r>
+              <a:rPr lang="en" sz="2400">
+                <a:solidFill>
+                  <a:schemeClr val="dk1"/>
+                </a:solidFill>
+              </a:rPr>
+              <a:t>Comparison With Different Sentiment Analysis Approaches </a:t>
+            </a:r>
+            <a:endParaRPr sz="2400">
+              <a:solidFill>
+                <a:schemeClr val="dk1"/>
+              </a:solidFill>
+            </a:endParaRPr>
+          </a:p>
+        </p:txBody>
+      </p:sp>
+      <p:sp>
+        <p:nvSpPr>
+          <p:cNvPr id="200" name="Google Shape;200;p32"/>
+          <p:cNvSpPr txBox="1"/>
+          <p:nvPr>
+            <p:ph idx="4294967295" type="title"/>
+          </p:nvPr>
+        </p:nvSpPr>
+        <p:spPr>
+          <a:xfrm>
+            <a:off x="96800" y="712925"/>
+            <a:ext cx="8333700" cy="480600"/>
+          </a:xfrm>
+          <a:prstGeom prst="rect">
+            <a:avLst/>
+          </a:prstGeom>
+        </p:spPr>
+        <p:txBody>
+          <a:bodyPr anchorCtr="0" anchor="t" bIns="91425" lIns="91425" spcFirstLastPara="1" rIns="91425" wrap="square" tIns="91425">
+            <a:noAutofit/>
+          </a:bodyPr>
+          <a:lstStyle/>
+          <a:p>
+            <a:pPr indent="0" lvl="0" marL="0" marR="279400" rtl="0" algn="ctr">
+              <a:lnSpc>
+                <a:spcPct val="142857"/>
+              </a:lnSpc>
+              <a:spcBef>
+                <a:spcPts val="0"/>
+              </a:spcBef>
+              <a:spcAft>
+                <a:spcPts val="0"/>
+              </a:spcAft>
+              <a:buNone/>
+            </a:pPr>
+            <a:r>
+              <a:rPr b="0" lang="en" sz="1550" u="sng">
+                <a:solidFill>
+                  <a:srgbClr val="0000FF"/>
+                </a:solidFill>
+                <a:highlight>
+                  <a:srgbClr val="FFFFFF"/>
+                </a:highlight>
+                <a:latin typeface="Arial"/>
+                <a:ea typeface="Arial"/>
+                <a:cs typeface="Arial"/>
+                <a:sym typeface="Arial"/>
+              </a:rPr>
+              <a:t>Using </a:t>
+            </a:r>
+            <a:r>
+              <a:rPr b="0" lang="en" sz="1600" u="sng">
+                <a:solidFill>
+                  <a:srgbClr val="0000FF"/>
+                </a:solidFill>
+                <a:highlight>
+                  <a:srgbClr val="FFFFFF"/>
+                </a:highlight>
+                <a:latin typeface="Arial"/>
+                <a:ea typeface="Arial"/>
+                <a:cs typeface="Arial"/>
+                <a:sym typeface="Arial"/>
+              </a:rPr>
+              <a:t> Recurrent neural network (CNN) based </a:t>
+            </a:r>
+            <a:r>
+              <a:rPr b="0" lang="en" sz="1600" u="sng">
+                <a:solidFill>
+                  <a:srgbClr val="0000FF"/>
+                </a:solidFill>
+                <a:highlight>
+                  <a:srgbClr val="FFFFFF"/>
+                </a:highlight>
+                <a:latin typeface="Arial"/>
+                <a:ea typeface="Arial"/>
+                <a:cs typeface="Arial"/>
+                <a:sym typeface="Arial"/>
+              </a:rPr>
+              <a:t>CuDNNLSTM Implementation</a:t>
+            </a:r>
+            <a:endParaRPr b="0" sz="1600" u="sng">
+              <a:solidFill>
+                <a:srgbClr val="0000FF"/>
+              </a:solidFill>
+              <a:highlight>
+                <a:srgbClr val="FFFFFF"/>
+              </a:highlight>
+              <a:latin typeface="Arial"/>
+              <a:ea typeface="Arial"/>
+              <a:cs typeface="Arial"/>
+              <a:sym typeface="Arial"/>
+            </a:endParaRPr>
+          </a:p>
+        </p:txBody>
+      </p:sp>
+      <p:sp>
+        <p:nvSpPr>
+          <p:cNvPr id="201" name="Google Shape;201;p32"/>
+          <p:cNvSpPr txBox="1"/>
+          <p:nvPr>
+            <p:ph idx="4294967295" type="title"/>
+          </p:nvPr>
+        </p:nvSpPr>
+        <p:spPr>
+          <a:xfrm>
+            <a:off x="96800" y="4161700"/>
+            <a:ext cx="8333700" cy="981900"/>
+          </a:xfrm>
+          <a:prstGeom prst="rect">
+            <a:avLst/>
+          </a:prstGeom>
+        </p:spPr>
+        <p:txBody>
+          <a:bodyPr anchorCtr="0" anchor="t" bIns="91425" lIns="91425" spcFirstLastPara="1" rIns="91425" wrap="square" tIns="91425">
+            <a:noAutofit/>
+          </a:bodyPr>
+          <a:lstStyle/>
+          <a:p>
+            <a:pPr indent="-327025" lvl="0" marL="457200" marR="279400" rtl="0" algn="l">
+              <a:lnSpc>
+                <a:spcPct val="142857"/>
+              </a:lnSpc>
+              <a:spcBef>
+                <a:spcPts val="0"/>
+              </a:spcBef>
+              <a:spcAft>
+                <a:spcPts val="0"/>
+              </a:spcAft>
+              <a:buClr>
+                <a:srgbClr val="000000"/>
+              </a:buClr>
+              <a:buSzPts val="1550"/>
+              <a:buFont typeface="Arial"/>
+              <a:buChar char="●"/>
+            </a:pPr>
+            <a:r>
+              <a:rPr b="0" lang="en" sz="1550">
+                <a:solidFill>
+                  <a:srgbClr val="000000"/>
+                </a:solidFill>
+                <a:highlight>
+                  <a:srgbClr val="FFFFFF"/>
+                </a:highlight>
+                <a:latin typeface="Arial"/>
+                <a:ea typeface="Arial"/>
+                <a:cs typeface="Arial"/>
+                <a:sym typeface="Arial"/>
+              </a:rPr>
+              <a:t>With This approach a maximum accuracy of 93.7% was achieved.</a:t>
+            </a:r>
+            <a:endParaRPr b="0" sz="1550">
+              <a:solidFill>
+                <a:srgbClr val="000000"/>
+              </a:solidFill>
+              <a:highlight>
+                <a:srgbClr val="FFFFFF"/>
+              </a:highlight>
+              <a:latin typeface="Arial"/>
+              <a:ea typeface="Arial"/>
+              <a:cs typeface="Arial"/>
+              <a:sym typeface="Arial"/>
+            </a:endParaRPr>
+          </a:p>
+          <a:p>
+            <a:pPr indent="-327025" lvl="0" marL="457200" marR="279400" rtl="0" algn="l">
+              <a:lnSpc>
+                <a:spcPct val="142857"/>
+              </a:lnSpc>
+              <a:spcBef>
+                <a:spcPts val="0"/>
+              </a:spcBef>
+              <a:spcAft>
+                <a:spcPts val="0"/>
+              </a:spcAft>
+              <a:buClr>
+                <a:srgbClr val="000000"/>
+              </a:buClr>
+              <a:buSzPts val="1550"/>
+              <a:buFont typeface="Arial"/>
+              <a:buChar char="●"/>
+            </a:pPr>
+            <a:r>
+              <a:rPr b="0" lang="en" sz="1550">
+                <a:solidFill>
+                  <a:srgbClr val="000000"/>
+                </a:solidFill>
+                <a:highlight>
+                  <a:srgbClr val="FFFFFF"/>
+                </a:highlight>
+                <a:latin typeface="Arial"/>
+                <a:ea typeface="Arial"/>
+                <a:cs typeface="Arial"/>
+                <a:sym typeface="Arial"/>
+              </a:rPr>
+              <a:t>Link : </a:t>
+            </a:r>
+            <a:r>
+              <a:rPr b="0" lang="en" sz="1550">
+                <a:solidFill>
+                  <a:srgbClr val="000000"/>
+                </a:solidFill>
+                <a:highlight>
+                  <a:srgbClr val="FFFFFF"/>
+                </a:highlight>
+                <a:latin typeface="Arial"/>
+                <a:ea typeface="Arial"/>
+                <a:cs typeface="Arial"/>
+                <a:sym typeface="Arial"/>
+              </a:rPr>
+              <a:t>https://www.kaggle.com/anshulrai/cudnnlstm-implementation-93-7-accuracy</a:t>
+            </a:r>
+            <a:endParaRPr b="0" sz="1550">
+              <a:solidFill>
+                <a:srgbClr val="000000"/>
+              </a:solidFill>
+              <a:highlight>
+                <a:srgbClr val="FFFFFF"/>
+              </a:highlight>
+              <a:latin typeface="Arial"/>
+              <a:ea typeface="Arial"/>
+              <a:cs typeface="Arial"/>
+              <a:sym typeface="Arial"/>
+            </a:endParaRPr>
+          </a:p>
+        </p:txBody>
+      </p:sp>
+      <p:pic>
+        <p:nvPicPr>
+          <p:cNvPr id="202" name="Google Shape;202;p32"/>
+          <p:cNvPicPr preferRelativeResize="0"/>
+          <p:nvPr/>
+        </p:nvPicPr>
+        <p:blipFill>
+          <a:blip r:embed="rId3">
+            <a:alphaModFix/>
+          </a:blip>
+          <a:stretch>
+            <a:fillRect/>
+          </a:stretch>
+        </p:blipFill>
+        <p:spPr>
+          <a:xfrm>
+            <a:off x="765238" y="1345925"/>
+            <a:ext cx="7117131" cy="2663375"/>
+          </a:xfrm>
+          <a:prstGeom prst="rect">
+            <a:avLst/>
+          </a:prstGeom>
+          <a:noFill/>
+          <a:ln>
+            <a:noFill/>
+          </a:ln>
+        </p:spPr>
+      </p:pic>
+    </p:spTree>
+  </p:cSld>
+  <p:clrMapOvr>
+    <a:masterClrMapping/>
+  </p:clrMapOvr>
+</p:sld>
+</file>
+
+<file path=ppt/slides/slide21.xml><?xml version="1.0" encoding="utf-8"?>
+<p:sld xmlns:a="http://schemas.openxmlformats.org/drawingml/2006/main" xmlns:r="http://schemas.openxmlformats.org/officeDocument/2006/relationships" xmlns:mc="http://schemas.openxmlformats.org/markup-compatibility/2006" xmlns:mv="urn:schemas-microsoft-com:mac:vml" xmlns:p="http://schemas.openxmlformats.org/presentationml/2006/main" xmlns:c="http://schemas.openxmlformats.org/drawingml/2006/chart" xmlns:dgm="http://schemas.openxmlformats.org/drawingml/2006/diagram" xmlns:o="urn:schemas-microsoft-com:office:office" xmlns:v="urn:schemas-microsoft-com:vml" xmlns:pvml="urn:schemas-microsoft-com:office:powerpoint" xmlns:com="http://schemas.openxmlformats.org/drawingml/2006/compatibility" xmlns:p14="http://schemas.microsoft.com/office/powerpoint/2010/main" xmlns:p15="http://schemas.microsoft.com/office/powerpoint/2012/main" xmlns:ahyp="http://schemas.microsoft.com/office/drawing/2018/hyperlinkcolor">
+  <p:cSld>
+    <p:bg>
+      <p:bgPr>
+        <a:solidFill>
+          <a:schemeClr val="dk1"/>
+        </a:solidFill>
+      </p:bgPr>
+    </p:bg>
+    <p:spTree>
+      <p:nvGrpSpPr>
+        <p:cNvPr id="206" name="Shape 206"/>
+        <p:cNvGrpSpPr/>
+        <p:nvPr/>
+      </p:nvGrpSpPr>
+      <p:grpSpPr>
+        <a:xfrm>
+          <a:off x="0" y="0"/>
+          <a:ext cx="0" cy="0"/>
+          <a:chOff x="0" y="0"/>
+          <a:chExt cx="0" cy="0"/>
+        </a:xfrm>
+      </p:grpSpPr>
+      <p:pic>
+        <p:nvPicPr>
+          <p:cNvPr id="207" name="Google Shape;207;p33"/>
+          <p:cNvPicPr preferRelativeResize="0"/>
+          <p:nvPr/>
+        </p:nvPicPr>
+        <p:blipFill>
+          <a:blip r:embed="rId3">
+            <a:alphaModFix/>
+          </a:blip>
+          <a:stretch>
+            <a:fillRect/>
+          </a:stretch>
+        </p:blipFill>
+        <p:spPr>
+          <a:xfrm>
+            <a:off x="2444700" y="162737"/>
+            <a:ext cx="4254600" cy="4818038"/>
+          </a:xfrm>
+          <a:prstGeom prst="rect">
+            <a:avLst/>
+          </a:prstGeom>
+          <a:noFill/>
+          <a:ln>
+            <a:noFill/>
+          </a:ln>
+        </p:spPr>
+      </p:pic>
+      <p:pic>
+        <p:nvPicPr>
+          <p:cNvPr descr="Piece of duct tape sticking a note to the slide" id="208" name="Google Shape;208;p33"/>
+          <p:cNvPicPr preferRelativeResize="0"/>
+          <p:nvPr/>
+        </p:nvPicPr>
+        <p:blipFill rotWithShape="1">
+          <a:blip r:embed="rId4">
+            <a:alphaModFix/>
+          </a:blip>
+          <a:srcRect b="10011" l="9244" r="2118" t="5926"/>
+          <a:stretch/>
+        </p:blipFill>
+        <p:spPr>
+          <a:xfrm rot="154828">
+            <a:off x="3536000" y="147301"/>
+            <a:ext cx="2072000" cy="736050"/>
+          </a:xfrm>
+          <a:prstGeom prst="rect">
+            <a:avLst/>
+          </a:prstGeom>
+          <a:noFill/>
+          <a:ln>
+            <a:noFill/>
+          </a:ln>
+        </p:spPr>
+      </p:pic>
+      <p:sp>
+        <p:nvSpPr>
+          <p:cNvPr id="209" name="Google Shape;209;p33"/>
+          <p:cNvSpPr txBox="1"/>
+          <p:nvPr/>
+        </p:nvSpPr>
+        <p:spPr>
+          <a:xfrm>
+            <a:off x="2855550" y="687397"/>
+            <a:ext cx="3432900" cy="762600"/>
+          </a:xfrm>
+          <a:prstGeom prst="rect">
+            <a:avLst/>
+          </a:prstGeom>
+          <a:noFill/>
+          <a:ln>
+            <a:noFill/>
+          </a:ln>
+        </p:spPr>
+        <p:txBody>
+          <a:bodyPr anchorCtr="0" anchor="b" bIns="91425" lIns="91425" spcFirstLastPara="1" rIns="91425" wrap="square" tIns="91425">
+            <a:noAutofit/>
+          </a:bodyPr>
+          <a:lstStyle/>
+          <a:p>
+            <a:pPr indent="0" lvl="0" marL="0" rtl="0" algn="l">
+              <a:spcBef>
+                <a:spcPts val="0"/>
+              </a:spcBef>
+              <a:spcAft>
+                <a:spcPts val="0"/>
+              </a:spcAft>
+              <a:buNone/>
+            </a:pPr>
+            <a:r>
+              <a:rPr b="1" lang="en" sz="3000">
+                <a:solidFill>
+                  <a:schemeClr val="lt2"/>
+                </a:solidFill>
+                <a:latin typeface="Raleway"/>
+                <a:ea typeface="Raleway"/>
+                <a:cs typeface="Raleway"/>
+                <a:sym typeface="Raleway"/>
+              </a:rPr>
+              <a:t>Thank You!</a:t>
+            </a:r>
+            <a:endParaRPr b="1" sz="3000">
+              <a:solidFill>
+                <a:schemeClr val="lt2"/>
+              </a:solidFill>
+              <a:latin typeface="Raleway"/>
+              <a:ea typeface="Raleway"/>
+              <a:cs typeface="Raleway"/>
+              <a:sym typeface="Raleway"/>
+            </a:endParaRPr>
+          </a:p>
+        </p:txBody>
+      </p:sp>
+      <p:sp>
+        <p:nvSpPr>
+          <p:cNvPr id="210" name="Google Shape;210;p33"/>
+          <p:cNvSpPr txBox="1"/>
+          <p:nvPr>
+            <p:ph idx="4294967295" type="body"/>
+          </p:nvPr>
+        </p:nvSpPr>
+        <p:spPr>
+          <a:xfrm>
+            <a:off x="2855550" y="1377478"/>
+            <a:ext cx="3432900" cy="1633500"/>
+          </a:xfrm>
+          <a:prstGeom prst="rect">
+            <a:avLst/>
+          </a:prstGeom>
+        </p:spPr>
+        <p:txBody>
+          <a:bodyPr anchorCtr="0" anchor="t" bIns="91425" lIns="91425" spcFirstLastPara="1" rIns="91425" wrap="square" tIns="91425">
+            <a:noAutofit/>
+          </a:bodyPr>
+          <a:lstStyle/>
+          <a:p>
+            <a:pPr indent="-304800" lvl="0" marL="457200" rtl="0" algn="l">
+              <a:spcBef>
+                <a:spcPts val="0"/>
+              </a:spcBef>
+              <a:spcAft>
+                <a:spcPts val="0"/>
+              </a:spcAft>
+              <a:buClr>
+                <a:schemeClr val="dk1"/>
+              </a:buClr>
+              <a:buSzPts val="1200"/>
+              <a:buFont typeface="Raleway"/>
+              <a:buChar char="-"/>
+            </a:pPr>
+            <a:r>
+              <a:rPr lang="en" sz="1200">
+                <a:latin typeface="Raleway"/>
+                <a:ea typeface="Raleway"/>
+                <a:cs typeface="Raleway"/>
+                <a:sym typeface="Raleway"/>
+              </a:rPr>
+              <a:t>Nishant Mittal (18074013)</a:t>
+            </a:r>
+            <a:endParaRPr sz="1200">
+              <a:latin typeface="Raleway"/>
+              <a:ea typeface="Raleway"/>
+              <a:cs typeface="Raleway"/>
+              <a:sym typeface="Raleway"/>
+            </a:endParaRPr>
+          </a:p>
+          <a:p>
+            <a:pPr indent="-304800" lvl="0" marL="457200" rtl="0" algn="l">
+              <a:spcBef>
+                <a:spcPts val="0"/>
+              </a:spcBef>
+              <a:spcAft>
+                <a:spcPts val="0"/>
+              </a:spcAft>
+              <a:buSzPts val="1200"/>
+              <a:buFont typeface="Raleway"/>
+              <a:buChar char="-"/>
+            </a:pPr>
+            <a:r>
+              <a:rPr lang="en" sz="1200">
+                <a:latin typeface="Raleway"/>
+                <a:ea typeface="Raleway"/>
+                <a:cs typeface="Raleway"/>
+                <a:sym typeface="Raleway"/>
+              </a:rPr>
+              <a:t>Mudit Bhardwaj (18074011)</a:t>
+            </a:r>
+            <a:endParaRPr sz="1200">
+              <a:latin typeface="Raleway"/>
+              <a:ea typeface="Raleway"/>
+              <a:cs typeface="Raleway"/>
+              <a:sym typeface="Raleway"/>
+            </a:endParaRPr>
+          </a:p>
+          <a:p>
+            <a:pPr indent="-304800" lvl="0" marL="457200" rtl="0" algn="l">
+              <a:spcBef>
+                <a:spcPts val="0"/>
+              </a:spcBef>
+              <a:spcAft>
+                <a:spcPts val="0"/>
+              </a:spcAft>
+              <a:buSzPts val="1200"/>
+              <a:buFont typeface="Raleway"/>
+              <a:buChar char="-"/>
+            </a:pPr>
+            <a:r>
+              <a:rPr lang="en" sz="1200">
+                <a:latin typeface="Raleway"/>
+                <a:ea typeface="Raleway"/>
+                <a:cs typeface="Raleway"/>
+                <a:sym typeface="Raleway"/>
+              </a:rPr>
+              <a:t>Aditya Patidar (18075006)</a:t>
+            </a:r>
+            <a:endParaRPr sz="1200">
+              <a:latin typeface="Raleway"/>
+              <a:ea typeface="Raleway"/>
+              <a:cs typeface="Raleway"/>
+              <a:sym typeface="Raleway"/>
+            </a:endParaRPr>
+          </a:p>
+          <a:p>
+            <a:pPr indent="-304800" lvl="0" marL="457200" rtl="0" algn="l">
+              <a:spcBef>
+                <a:spcPts val="0"/>
+              </a:spcBef>
+              <a:spcAft>
+                <a:spcPts val="0"/>
+              </a:spcAft>
+              <a:buSzPts val="1200"/>
+              <a:buFont typeface="Raleway"/>
+              <a:buChar char="-"/>
+            </a:pPr>
+            <a:r>
+              <a:rPr lang="en" sz="1200">
+                <a:latin typeface="Raleway"/>
+                <a:ea typeface="Raleway"/>
+                <a:cs typeface="Raleway"/>
+                <a:sym typeface="Raleway"/>
+              </a:rPr>
+              <a:t>Ayush Damele (18075014)</a:t>
+            </a:r>
+            <a:endParaRPr sz="1200">
+              <a:latin typeface="Raleway"/>
+              <a:ea typeface="Raleway"/>
+              <a:cs typeface="Raleway"/>
+              <a:sym typeface="Raleway"/>
+            </a:endParaRPr>
+          </a:p>
+        </p:txBody>
+      </p:sp>
+      <p:sp>
+        <p:nvSpPr>
+          <p:cNvPr id="211" name="Google Shape;211;p33"/>
+          <p:cNvSpPr txBox="1"/>
+          <p:nvPr/>
+        </p:nvSpPr>
+        <p:spPr>
+          <a:xfrm>
+            <a:off x="2855550" y="3495513"/>
+            <a:ext cx="2103000" cy="1012200"/>
+          </a:xfrm>
+          <a:prstGeom prst="rect">
+            <a:avLst/>
+          </a:prstGeom>
+          <a:noFill/>
+          <a:ln>
+            <a:noFill/>
+          </a:ln>
+        </p:spPr>
+        <p:txBody>
+          <a:bodyPr anchorCtr="0" anchor="b" bIns="91425" lIns="91425" spcFirstLastPara="1" rIns="91425" wrap="square" tIns="91425">
+            <a:noAutofit/>
+          </a:bodyPr>
+          <a:lstStyle/>
+          <a:p>
+            <a:pPr indent="0" lvl="0" marL="0" rtl="0" algn="l">
+              <a:lnSpc>
+                <a:spcPct val="115000"/>
+              </a:lnSpc>
+              <a:spcBef>
+                <a:spcPts val="0"/>
+              </a:spcBef>
+              <a:spcAft>
+                <a:spcPts val="0"/>
+              </a:spcAft>
+              <a:buNone/>
+            </a:pPr>
+            <a:r>
+              <a:t/>
+            </a:r>
+            <a:endParaRPr sz="1200">
+              <a:solidFill>
+                <a:schemeClr val="dk2"/>
+              </a:solidFill>
+              <a:latin typeface="Raleway"/>
+              <a:ea typeface="Raleway"/>
+              <a:cs typeface="Raleway"/>
+              <a:sym typeface="Raleway"/>
+            </a:endParaRPr>
+          </a:p>
+        </p:txBody>
+      </p:sp>
     </p:spTree>
   </p:cSld>
   <p:clrMapOvr>
@@ -12586,7 +13418,7 @@
         </p:nvSpPr>
         <p:spPr>
           <a:xfrm>
-            <a:off x="2855550" y="1377475"/>
+            <a:off x="2855550" y="1304000"/>
             <a:ext cx="3432900" cy="3327900"/>
           </a:xfrm>
           <a:prstGeom prst="rect">

</xml_diff>